<commit_message>
Módulo 9, aula criada.
</commit_message>
<xml_diff>
--- a/Módulo 09 - DataGrids/Módulo IX - DataGrids.pptx
+++ b/Módulo 09 - DataGrids/Módulo IX - DataGrids.pptx
@@ -174,13 +174,276 @@
 </p:cmAuthorLst>
 </file>
 
-<file path=ppt/revisionInfo.xml><?xml version="1.0" encoding="utf-8"?>
-<p1510:revInfo xmlns:a="http://schemas.openxmlformats.org/drawingml/2006/main" xmlns:r="http://schemas.openxmlformats.org/officeDocument/2006/relationships" xmlns:p1510="http://schemas.microsoft.com/office/powerpoint/2015/10/main">
-  <p1510:revLst>
-    <p1510:client id="{A96C9791-568C-2A0D-EF82-414A3B514621}" v="627" dt="2024-11-28T23:52:01.066"/>
-    <p1510:client id="{B613C77E-D392-32D7-70E5-E039F220970B}" v="18" dt="2024-11-29T23:04:37.108"/>
-  </p1510:revLst>
-</p1510:revInfo>
+<file path=ppt/changesInfos/changesInfo1.xml><?xml version="1.0" encoding="utf-8"?>
+<pc:chgInfo xmlns:a="http://schemas.openxmlformats.org/drawingml/2006/main" xmlns:r="http://schemas.openxmlformats.org/officeDocument/2006/relationships" xmlns:ac="http://schemas.microsoft.com/office/drawing/2013/main/command" xmlns:pc="http://schemas.microsoft.com/office/powerpoint/2013/main/command">
+  <pc:docChgLst>
+    <pc:chgData name="Laila Valença" userId="ca1b5de36cb8633a" providerId="LiveId" clId="{A2DFA14E-3EC7-4B66-B87C-B5161637BBAD}"/>
+    <pc:docChg chg="undo custSel modSld">
+      <pc:chgData name="Laila Valença" userId="ca1b5de36cb8633a" providerId="LiveId" clId="{A2DFA14E-3EC7-4B66-B87C-B5161637BBAD}" dt="2024-12-05T03:19:21.999" v="197" actId="20577"/>
+      <pc:docMkLst>
+        <pc:docMk/>
+      </pc:docMkLst>
+      <pc:sldChg chg="delSp modSp mod">
+        <pc:chgData name="Laila Valença" userId="ca1b5de36cb8633a" providerId="LiveId" clId="{A2DFA14E-3EC7-4B66-B87C-B5161637BBAD}" dt="2024-12-05T03:08:45.868" v="171" actId="1076"/>
+        <pc:sldMkLst>
+          <pc:docMk/>
+          <pc:sldMk cId="0" sldId="257"/>
+        </pc:sldMkLst>
+        <pc:spChg chg="mod">
+          <ac:chgData name="Laila Valença" userId="ca1b5de36cb8633a" providerId="LiveId" clId="{A2DFA14E-3EC7-4B66-B87C-B5161637BBAD}" dt="2024-12-05T03:08:40.694" v="170" actId="1076"/>
+          <ac:spMkLst>
+            <pc:docMk/>
+            <pc:sldMk cId="0" sldId="257"/>
+            <ac:spMk id="23" creationId="{00000000-0000-0000-0000-000000000000}"/>
+          </ac:spMkLst>
+        </pc:spChg>
+        <pc:spChg chg="mod">
+          <ac:chgData name="Laila Valença" userId="ca1b5de36cb8633a" providerId="LiveId" clId="{A2DFA14E-3EC7-4B66-B87C-B5161637BBAD}" dt="2024-12-05T03:08:45.868" v="171" actId="1076"/>
+          <ac:spMkLst>
+            <pc:docMk/>
+            <pc:sldMk cId="0" sldId="257"/>
+            <ac:spMk id="27" creationId="{00000000-0000-0000-0000-000000000000}"/>
+          </ac:spMkLst>
+        </pc:spChg>
+        <pc:spChg chg="del mod">
+          <ac:chgData name="Laila Valença" userId="ca1b5de36cb8633a" providerId="LiveId" clId="{A2DFA14E-3EC7-4B66-B87C-B5161637BBAD}" dt="2024-12-05T03:08:23.018" v="167"/>
+          <ac:spMkLst>
+            <pc:docMk/>
+            <pc:sldMk cId="0" sldId="257"/>
+            <ac:spMk id="36" creationId="{8227B136-1A81-430E-A876-00B874D65598}"/>
+          </ac:spMkLst>
+        </pc:spChg>
+        <pc:grpChg chg="mod">
+          <ac:chgData name="Laila Valença" userId="ca1b5de36cb8633a" providerId="LiveId" clId="{A2DFA14E-3EC7-4B66-B87C-B5161637BBAD}" dt="2024-12-05T03:08:34.682" v="169" actId="1076"/>
+          <ac:grpSpMkLst>
+            <pc:docMk/>
+            <pc:sldMk cId="0" sldId="257"/>
+            <ac:grpSpMk id="17" creationId="{00000000-0000-0000-0000-000000000000}"/>
+          </ac:grpSpMkLst>
+        </pc:grpChg>
+        <pc:grpChg chg="mod">
+          <ac:chgData name="Laila Valença" userId="ca1b5de36cb8633a" providerId="LiveId" clId="{A2DFA14E-3EC7-4B66-B87C-B5161637BBAD}" dt="2024-12-05T03:08:27.970" v="168" actId="1076"/>
+          <ac:grpSpMkLst>
+            <pc:docMk/>
+            <pc:sldMk cId="0" sldId="257"/>
+            <ac:grpSpMk id="19" creationId="{00000000-0000-0000-0000-000000000000}"/>
+          </ac:grpSpMkLst>
+        </pc:grpChg>
+        <pc:grpChg chg="del">
+          <ac:chgData name="Laila Valença" userId="ca1b5de36cb8633a" providerId="LiveId" clId="{A2DFA14E-3EC7-4B66-B87C-B5161637BBAD}" dt="2024-12-05T03:08:19.646" v="163" actId="478"/>
+          <ac:grpSpMkLst>
+            <pc:docMk/>
+            <pc:sldMk cId="0" sldId="257"/>
+            <ac:grpSpMk id="33" creationId="{A90C803F-1562-D80F-2DE3-34DB3B90E0B9}"/>
+          </ac:grpSpMkLst>
+        </pc:grpChg>
+      </pc:sldChg>
+      <pc:sldChg chg="modSp mod">
+        <pc:chgData name="Laila Valença" userId="ca1b5de36cb8633a" providerId="LiveId" clId="{A2DFA14E-3EC7-4B66-B87C-B5161637BBAD}" dt="2024-12-05T03:17:59.780" v="182" actId="20577"/>
+        <pc:sldMkLst>
+          <pc:docMk/>
+          <pc:sldMk cId="0" sldId="258"/>
+        </pc:sldMkLst>
+        <pc:spChg chg="mod">
+          <ac:chgData name="Laila Valença" userId="ca1b5de36cb8633a" providerId="LiveId" clId="{A2DFA14E-3EC7-4B66-B87C-B5161637BBAD}" dt="2024-12-05T03:17:59.780" v="182" actId="20577"/>
+          <ac:spMkLst>
+            <pc:docMk/>
+            <pc:sldMk cId="0" sldId="258"/>
+            <ac:spMk id="10" creationId="{12F746E5-C6EB-189C-72E0-676BCAF00637}"/>
+          </ac:spMkLst>
+        </pc:spChg>
+      </pc:sldChg>
+      <pc:sldChg chg="addSp modSp mod">
+        <pc:chgData name="Laila Valença" userId="ca1b5de36cb8633a" providerId="LiveId" clId="{A2DFA14E-3EC7-4B66-B87C-B5161637BBAD}" dt="2024-12-05T03:19:21.999" v="197" actId="20577"/>
+        <pc:sldMkLst>
+          <pc:docMk/>
+          <pc:sldMk cId="0" sldId="259"/>
+        </pc:sldMkLst>
+        <pc:spChg chg="add mod">
+          <ac:chgData name="Laila Valença" userId="ca1b5de36cb8633a" providerId="LiveId" clId="{A2DFA14E-3EC7-4B66-B87C-B5161637BBAD}" dt="2024-12-05T03:19:21.999" v="197" actId="20577"/>
+          <ac:spMkLst>
+            <pc:docMk/>
+            <pc:sldMk cId="0" sldId="259"/>
+            <ac:spMk id="7" creationId="{EB02D6A5-0E3E-F37E-E8EE-325971DEBF62}"/>
+          </ac:spMkLst>
+        </pc:spChg>
+        <pc:graphicFrameChg chg="add mod">
+          <ac:chgData name="Laila Valença" userId="ca1b5de36cb8633a" providerId="LiveId" clId="{A2DFA14E-3EC7-4B66-B87C-B5161637BBAD}" dt="2024-12-05T03:18:46.095" v="186"/>
+          <ac:graphicFrameMkLst>
+            <pc:docMk/>
+            <pc:sldMk cId="0" sldId="259"/>
+            <ac:graphicFrameMk id="4" creationId="{FF581A83-AE5E-E2E7-FF24-5ECF5DE668D2}"/>
+          </ac:graphicFrameMkLst>
+        </pc:graphicFrameChg>
+      </pc:sldChg>
+      <pc:sldChg chg="modSp mod">
+        <pc:chgData name="Laila Valença" userId="ca1b5de36cb8633a" providerId="LiveId" clId="{A2DFA14E-3EC7-4B66-B87C-B5161637BBAD}" dt="2024-12-05T03:08:11.179" v="162" actId="20577"/>
+        <pc:sldMkLst>
+          <pc:docMk/>
+          <pc:sldMk cId="0" sldId="266"/>
+        </pc:sldMkLst>
+        <pc:spChg chg="mod">
+          <ac:chgData name="Laila Valença" userId="ca1b5de36cb8633a" providerId="LiveId" clId="{A2DFA14E-3EC7-4B66-B87C-B5161637BBAD}" dt="2024-12-05T03:08:11.179" v="162" actId="20577"/>
+          <ac:spMkLst>
+            <pc:docMk/>
+            <pc:sldMk cId="0" sldId="266"/>
+            <ac:spMk id="3" creationId="{00000000-0000-0000-0000-000000000000}"/>
+          </ac:spMkLst>
+        </pc:spChg>
+      </pc:sldChg>
+      <pc:sldChg chg="addSp delSp modSp mod">
+        <pc:chgData name="Laila Valença" userId="ca1b5de36cb8633a" providerId="LiveId" clId="{A2DFA14E-3EC7-4B66-B87C-B5161637BBAD}" dt="2024-12-05T03:07:55.217" v="160" actId="1076"/>
+        <pc:sldMkLst>
+          <pc:docMk/>
+          <pc:sldMk cId="2816891920" sldId="267"/>
+        </pc:sldMkLst>
+        <pc:spChg chg="add del mod">
+          <ac:chgData name="Laila Valença" userId="ca1b5de36cb8633a" providerId="LiveId" clId="{A2DFA14E-3EC7-4B66-B87C-B5161637BBAD}" dt="2024-12-05T03:04:25.033" v="110" actId="255"/>
+          <ac:spMkLst>
+            <pc:docMk/>
+            <pc:sldMk cId="2816891920" sldId="267"/>
+            <ac:spMk id="4" creationId="{00000000-0000-0000-0000-000000000000}"/>
+          </ac:spMkLst>
+        </pc:spChg>
+        <pc:spChg chg="add del mod">
+          <ac:chgData name="Laila Valença" userId="ca1b5de36cb8633a" providerId="LiveId" clId="{A2DFA14E-3EC7-4B66-B87C-B5161637BBAD}" dt="2024-12-05T03:04:02.271" v="106"/>
+          <ac:spMkLst>
+            <pc:docMk/>
+            <pc:sldMk cId="2816891920" sldId="267"/>
+            <ac:spMk id="5" creationId="{00000000-0000-0000-0000-000000000000}"/>
+          </ac:spMkLst>
+        </pc:spChg>
+        <pc:spChg chg="add del mod">
+          <ac:chgData name="Laila Valença" userId="ca1b5de36cb8633a" providerId="LiveId" clId="{A2DFA14E-3EC7-4B66-B87C-B5161637BBAD}" dt="2024-12-05T03:03:46.266" v="87" actId="22"/>
+          <ac:spMkLst>
+            <pc:docMk/>
+            <pc:sldMk cId="2816891920" sldId="267"/>
+            <ac:spMk id="13" creationId="{C4FF241B-166D-080A-6C57-3E8EFC9C957B}"/>
+          </ac:spMkLst>
+        </pc:spChg>
+        <pc:spChg chg="add mod">
+          <ac:chgData name="Laila Valença" userId="ca1b5de36cb8633a" providerId="LiveId" clId="{A2DFA14E-3EC7-4B66-B87C-B5161637BBAD}" dt="2024-12-05T03:07:55.217" v="160" actId="1076"/>
+          <ac:spMkLst>
+            <pc:docMk/>
+            <pc:sldMk cId="2816891920" sldId="267"/>
+            <ac:spMk id="20" creationId="{EC058378-8A17-40F9-1E8D-67876AA983DC}"/>
+          </ac:spMkLst>
+        </pc:spChg>
+        <pc:spChg chg="add mod">
+          <ac:chgData name="Laila Valença" userId="ca1b5de36cb8633a" providerId="LiveId" clId="{A2DFA14E-3EC7-4B66-B87C-B5161637BBAD}" dt="2024-12-05T03:07:45.642" v="158"/>
+          <ac:spMkLst>
+            <pc:docMk/>
+            <pc:sldMk cId="2816891920" sldId="267"/>
+            <ac:spMk id="21" creationId="{9C8CD144-701D-B503-F0BC-ADCE58FAC3DE}"/>
+          </ac:spMkLst>
+        </pc:spChg>
+        <pc:picChg chg="add mod">
+          <ac:chgData name="Laila Valença" userId="ca1b5de36cb8633a" providerId="LiveId" clId="{A2DFA14E-3EC7-4B66-B87C-B5161637BBAD}" dt="2024-12-05T03:03:48.716" v="95" actId="1076"/>
+          <ac:picMkLst>
+            <pc:docMk/>
+            <pc:sldMk cId="2816891920" sldId="267"/>
+            <ac:picMk id="7" creationId="{83EEFDF6-73CF-CBB1-5BF0-7D3D5E93391F}"/>
+          </ac:picMkLst>
+        </pc:picChg>
+        <pc:picChg chg="add del">
+          <ac:chgData name="Laila Valença" userId="ca1b5de36cb8633a" providerId="LiveId" clId="{A2DFA14E-3EC7-4B66-B87C-B5161637BBAD}" dt="2024-12-05T03:04:03.418" v="107" actId="478"/>
+          <ac:picMkLst>
+            <pc:docMk/>
+            <pc:sldMk cId="2816891920" sldId="267"/>
+            <ac:picMk id="9" creationId="{23124575-2B41-2408-F62D-7F94E58496E6}"/>
+          </ac:picMkLst>
+        </pc:picChg>
+        <pc:picChg chg="add mod">
+          <ac:chgData name="Laila Valença" userId="ca1b5de36cb8633a" providerId="LiveId" clId="{A2DFA14E-3EC7-4B66-B87C-B5161637BBAD}" dt="2024-12-05T03:03:48.956" v="96" actId="1076"/>
+          <ac:picMkLst>
+            <pc:docMk/>
+            <pc:sldMk cId="2816891920" sldId="267"/>
+            <ac:picMk id="10" creationId="{80491B57-59B3-8E27-5CD8-E3886DD7D2E6}"/>
+          </ac:picMkLst>
+        </pc:picChg>
+        <pc:picChg chg="add del">
+          <ac:chgData name="Laila Valença" userId="ca1b5de36cb8633a" providerId="LiveId" clId="{A2DFA14E-3EC7-4B66-B87C-B5161637BBAD}" dt="2024-12-05T03:04:03.980" v="108" actId="478"/>
+          <ac:picMkLst>
+            <pc:docMk/>
+            <pc:sldMk cId="2816891920" sldId="267"/>
+            <ac:picMk id="11" creationId="{B34DDB36-8A25-7954-4346-F3E05009723A}"/>
+          </ac:picMkLst>
+        </pc:picChg>
+        <pc:picChg chg="add mod">
+          <ac:chgData name="Laila Valença" userId="ca1b5de36cb8633a" providerId="LiveId" clId="{A2DFA14E-3EC7-4B66-B87C-B5161637BBAD}" dt="2024-12-05T03:07:51.146" v="159" actId="1076"/>
+          <ac:picMkLst>
+            <pc:docMk/>
+            <pc:sldMk cId="2816891920" sldId="267"/>
+            <ac:picMk id="15" creationId="{086BB331-A0FB-6671-35F1-945AEE28FCD2}"/>
+          </ac:picMkLst>
+        </pc:picChg>
+        <pc:picChg chg="add del mod">
+          <ac:chgData name="Laila Valença" userId="ca1b5de36cb8633a" providerId="LiveId" clId="{A2DFA14E-3EC7-4B66-B87C-B5161637BBAD}" dt="2024-12-05T03:05:11.423" v="114" actId="478"/>
+          <ac:picMkLst>
+            <pc:docMk/>
+            <pc:sldMk cId="2816891920" sldId="267"/>
+            <ac:picMk id="17" creationId="{36DA525A-874F-C0A0-7AC6-4C616E8E48FE}"/>
+          </ac:picMkLst>
+        </pc:picChg>
+        <pc:picChg chg="add mod">
+          <ac:chgData name="Laila Valença" userId="ca1b5de36cb8633a" providerId="LiveId" clId="{A2DFA14E-3EC7-4B66-B87C-B5161637BBAD}" dt="2024-12-05T03:05:32.905" v="119" actId="1076"/>
+          <ac:picMkLst>
+            <pc:docMk/>
+            <pc:sldMk cId="2816891920" sldId="267"/>
+            <ac:picMk id="19" creationId="{3B87F486-01B7-967E-DFDC-BE9B6D3112B3}"/>
+          </ac:picMkLst>
+        </pc:picChg>
+      </pc:sldChg>
+      <pc:sldChg chg="addSp modSp mod">
+        <pc:chgData name="Laila Valença" userId="ca1b5de36cb8633a" providerId="LiveId" clId="{A2DFA14E-3EC7-4B66-B87C-B5161637BBAD}" dt="2024-12-04T22:51:57.299" v="65" actId="1076"/>
+        <pc:sldMkLst>
+          <pc:docMk/>
+          <pc:sldMk cId="3839218115" sldId="268"/>
+        </pc:sldMkLst>
+        <pc:spChg chg="mod">
+          <ac:chgData name="Laila Valença" userId="ca1b5de36cb8633a" providerId="LiveId" clId="{A2DFA14E-3EC7-4B66-B87C-B5161637BBAD}" dt="2024-12-04T22:06:24.931" v="7" actId="20577"/>
+          <ac:spMkLst>
+            <pc:docMk/>
+            <pc:sldMk cId="3839218115" sldId="268"/>
+            <ac:spMk id="4" creationId="{D4E04871-DB0F-A8E0-8B36-0198EF7382AD}"/>
+          </ac:spMkLst>
+        </pc:spChg>
+        <pc:spChg chg="add mod">
+          <ac:chgData name="Laila Valença" userId="ca1b5de36cb8633a" providerId="LiveId" clId="{A2DFA14E-3EC7-4B66-B87C-B5161637BBAD}" dt="2024-12-04T22:51:51.504" v="63" actId="1076"/>
+          <ac:spMkLst>
+            <pc:docMk/>
+            <pc:sldMk cId="3839218115" sldId="268"/>
+            <ac:spMk id="9" creationId="{E972DFED-6EA3-87D3-A616-C79B80E91BA4}"/>
+          </ac:spMkLst>
+        </pc:spChg>
+        <pc:spChg chg="add mod">
+          <ac:chgData name="Laila Valença" userId="ca1b5de36cb8633a" providerId="LiveId" clId="{A2DFA14E-3EC7-4B66-B87C-B5161637BBAD}" dt="2024-12-04T22:51:57.299" v="65" actId="1076"/>
+          <ac:spMkLst>
+            <pc:docMk/>
+            <pc:sldMk cId="3839218115" sldId="268"/>
+            <ac:spMk id="10" creationId="{05D524C2-DCF8-3CD9-9542-C2F4D258A582}"/>
+          </ac:spMkLst>
+        </pc:spChg>
+        <pc:picChg chg="add mod">
+          <ac:chgData name="Laila Valença" userId="ca1b5de36cb8633a" providerId="LiveId" clId="{A2DFA14E-3EC7-4B66-B87C-B5161637BBAD}" dt="2024-12-04T22:51:48.050" v="62" actId="1076"/>
+          <ac:picMkLst>
+            <pc:docMk/>
+            <pc:sldMk cId="3839218115" sldId="268"/>
+            <ac:picMk id="6" creationId="{C8B8C4DE-EC41-555E-B6D2-C8877E7162CF}"/>
+          </ac:picMkLst>
+        </pc:picChg>
+        <pc:picChg chg="add mod">
+          <ac:chgData name="Laila Valença" userId="ca1b5de36cb8633a" providerId="LiveId" clId="{A2DFA14E-3EC7-4B66-B87C-B5161637BBAD}" dt="2024-12-04T22:51:52.982" v="64" actId="1076"/>
+          <ac:picMkLst>
+            <pc:docMk/>
+            <pc:sldMk cId="3839218115" sldId="268"/>
+            <ac:picMk id="8" creationId="{F49E7ED8-E72B-F281-CC62-EABD0C73F0E7}"/>
+          </ac:picMkLst>
+        </pc:picChg>
+      </pc:sldChg>
+    </pc:docChg>
+  </pc:docChgLst>
+</pc:chgInfo>
 </file>
 
 <file path=ppt/slideLayouts/slideLayout1.xml><?xml version="1.0" encoding="utf-8"?>
@@ -363,7 +626,7 @@
             <a:fld id="{1D8BD707-D9CF-40AE-B4C6-C98DA3205C09}" type="datetimeFigureOut">
               <a:rPr lang="en-US" smtClean="0"/>
               <a:pPr/>
-              <a:t>12/3/2024</a:t>
+              <a:t>12/4/2024</a:t>
             </a:fld>
             <a:endParaRPr lang="en-US"/>
           </a:p>
@@ -528,7 +791,7 @@
             <a:fld id="{1D8BD707-D9CF-40AE-B4C6-C98DA3205C09}" type="datetimeFigureOut">
               <a:rPr lang="en-US" smtClean="0"/>
               <a:pPr/>
-              <a:t>12/3/2024</a:t>
+              <a:t>12/4/2024</a:t>
             </a:fld>
             <a:endParaRPr lang="en-US"/>
           </a:p>
@@ -703,7 +966,7 @@
             <a:fld id="{1D8BD707-D9CF-40AE-B4C6-C98DA3205C09}" type="datetimeFigureOut">
               <a:rPr lang="en-US" smtClean="0"/>
               <a:pPr/>
-              <a:t>12/3/2024</a:t>
+              <a:t>12/4/2024</a:t>
             </a:fld>
             <a:endParaRPr lang="en-US"/>
           </a:p>
@@ -868,7 +1131,7 @@
             <a:fld id="{1D8BD707-D9CF-40AE-B4C6-C98DA3205C09}" type="datetimeFigureOut">
               <a:rPr lang="en-US" smtClean="0"/>
               <a:pPr/>
-              <a:t>12/3/2024</a:t>
+              <a:t>12/4/2024</a:t>
             </a:fld>
             <a:endParaRPr lang="en-US"/>
           </a:p>
@@ -1110,7 +1373,7 @@
             <a:fld id="{1D8BD707-D9CF-40AE-B4C6-C98DA3205C09}" type="datetimeFigureOut">
               <a:rPr lang="en-US" smtClean="0"/>
               <a:pPr/>
-              <a:t>12/3/2024</a:t>
+              <a:t>12/4/2024</a:t>
             </a:fld>
             <a:endParaRPr lang="en-US"/>
           </a:p>
@@ -1392,7 +1655,7 @@
             <a:fld id="{1D8BD707-D9CF-40AE-B4C6-C98DA3205C09}" type="datetimeFigureOut">
               <a:rPr lang="en-US" smtClean="0"/>
               <a:pPr/>
-              <a:t>12/3/2024</a:t>
+              <a:t>12/4/2024</a:t>
             </a:fld>
             <a:endParaRPr lang="en-US"/>
           </a:p>
@@ -1808,7 +2071,7 @@
             <a:fld id="{1D8BD707-D9CF-40AE-B4C6-C98DA3205C09}" type="datetimeFigureOut">
               <a:rPr lang="en-US" smtClean="0"/>
               <a:pPr/>
-              <a:t>12/3/2024</a:t>
+              <a:t>12/4/2024</a:t>
             </a:fld>
             <a:endParaRPr lang="en-US"/>
           </a:p>
@@ -1922,7 +2185,7 @@
             <a:fld id="{1D8BD707-D9CF-40AE-B4C6-C98DA3205C09}" type="datetimeFigureOut">
               <a:rPr lang="en-US" smtClean="0"/>
               <a:pPr/>
-              <a:t>12/3/2024</a:t>
+              <a:t>12/4/2024</a:t>
             </a:fld>
             <a:endParaRPr lang="en-US"/>
           </a:p>
@@ -2014,7 +2277,7 @@
             <a:fld id="{1D8BD707-D9CF-40AE-B4C6-C98DA3205C09}" type="datetimeFigureOut">
               <a:rPr lang="en-US" smtClean="0"/>
               <a:pPr/>
-              <a:t>12/3/2024</a:t>
+              <a:t>12/4/2024</a:t>
             </a:fld>
             <a:endParaRPr lang="en-US"/>
           </a:p>
@@ -2286,7 +2549,7 @@
             <a:fld id="{1D8BD707-D9CF-40AE-B4C6-C98DA3205C09}" type="datetimeFigureOut">
               <a:rPr lang="en-US" smtClean="0"/>
               <a:pPr/>
-              <a:t>12/3/2024</a:t>
+              <a:t>12/4/2024</a:t>
             </a:fld>
             <a:endParaRPr lang="en-US"/>
           </a:p>
@@ -2535,7 +2798,7 @@
             <a:fld id="{1D8BD707-D9CF-40AE-B4C6-C98DA3205C09}" type="datetimeFigureOut">
               <a:rPr lang="en-US" smtClean="0"/>
               <a:pPr/>
-              <a:t>12/3/2024</a:t>
+              <a:t>12/4/2024</a:t>
             </a:fld>
             <a:endParaRPr lang="en-US"/>
           </a:p>
@@ -2743,7 +3006,7 @@
             <a:fld id="{1D8BD707-D9CF-40AE-B4C6-C98DA3205C09}" type="datetimeFigureOut">
               <a:rPr lang="en-US" smtClean="0"/>
               <a:pPr/>
-              <a:t>12/3/2024</a:t>
+              <a:t>12/4/2024</a:t>
             </a:fld>
             <a:endParaRPr lang="en-US"/>
           </a:p>
@@ -4578,7 +4841,7 @@
         </p:nvGrpSpPr>
         <p:grpSpPr>
           <a:xfrm rot="-5400000">
-            <a:off x="568482" y="3593109"/>
+            <a:off x="557247" y="4227073"/>
             <a:ext cx="829509" cy="1966473"/>
             <a:chOff x="0" y="0"/>
             <a:chExt cx="2354580" cy="5581882"/>
@@ -4658,7 +4921,7 @@
         </p:nvGrpSpPr>
         <p:grpSpPr>
           <a:xfrm rot="-5400000">
-            <a:off x="568482" y="4964709"/>
+            <a:off x="568483" y="6197871"/>
             <a:ext cx="829509" cy="1966473"/>
             <a:chOff x="0" y="0"/>
             <a:chExt cx="2354580" cy="5581882"/>
@@ -4795,7 +5058,7 @@
         </p:nvSpPr>
         <p:spPr>
           <a:xfrm>
-            <a:off x="2110928" y="5688065"/>
+            <a:off x="2110928" y="6950588"/>
             <a:ext cx="8340280" cy="520207"/>
           </a:xfrm>
           <a:prstGeom prst="rect">
@@ -4893,7 +5156,7 @@
         </p:nvSpPr>
         <p:spPr>
           <a:xfrm>
-            <a:off x="2110928" y="4316465"/>
+            <a:off x="2186835" y="4883396"/>
             <a:ext cx="7343333" cy="520207"/>
           </a:xfrm>
           <a:prstGeom prst="rect">
@@ -4928,233 +5191,6 @@
               </a:solidFill>
               <a:latin typeface="Lato Bold"/>
             </a:endParaRPr>
-          </a:p>
-        </p:txBody>
-      </p:sp>
-      <p:grpSp>
-        <p:nvGrpSpPr>
-          <p:cNvPr id="33" name="Group 19">
-            <a:extLst>
-              <a:ext uri="{FF2B5EF4-FFF2-40B4-BE49-F238E27FC236}">
-                <a16:creationId xmlns:a16="http://schemas.microsoft.com/office/drawing/2014/main" id="{A90C803F-1562-D80F-2DE3-34DB3B90E0B9}"/>
-              </a:ext>
-            </a:extLst>
-          </p:cNvPr>
-          <p:cNvGrpSpPr/>
-          <p:nvPr/>
-        </p:nvGrpSpPr>
-        <p:grpSpPr>
-          <a:xfrm rot="-5400000">
-            <a:off x="583209" y="6336308"/>
-            <a:ext cx="829509" cy="1966473"/>
-            <a:chOff x="0" y="0"/>
-            <a:chExt cx="2354580" cy="5581882"/>
-          </a:xfrm>
-        </p:grpSpPr>
-        <p:sp>
-          <p:nvSpPr>
-            <p:cNvPr id="34" name="Freeform 20">
-              <a:extLst>
-                <a:ext uri="{FF2B5EF4-FFF2-40B4-BE49-F238E27FC236}">
-                  <a16:creationId xmlns:a16="http://schemas.microsoft.com/office/drawing/2014/main" id="{2E2CA7D0-5D35-D2B1-83F6-363D46057177}"/>
-                </a:ext>
-              </a:extLst>
-            </p:cNvPr>
-            <p:cNvSpPr/>
-            <p:nvPr/>
-          </p:nvSpPr>
-          <p:spPr>
-            <a:xfrm>
-              <a:off x="0" y="0"/>
-              <a:ext cx="2353310" cy="5581882"/>
-            </a:xfrm>
-            <a:custGeom>
-              <a:avLst/>
-              <a:gdLst/>
-              <a:ahLst/>
-              <a:cxnLst/>
-              <a:rect l="l" t="t" r="r" b="b"/>
-              <a:pathLst>
-                <a:path w="2353310" h="5581882">
-                  <a:moveTo>
-                    <a:pt x="784860" y="5514572"/>
-                  </a:moveTo>
-                  <a:cubicBezTo>
-                    <a:pt x="905510" y="5555212"/>
-                    <a:pt x="1042670" y="5581882"/>
-                    <a:pt x="1177290" y="5581882"/>
-                  </a:cubicBezTo>
-                  <a:cubicBezTo>
-                    <a:pt x="1311910" y="5581882"/>
-                    <a:pt x="1441450" y="5559022"/>
-                    <a:pt x="1560830" y="5518382"/>
-                  </a:cubicBezTo>
-                  <a:cubicBezTo>
-                    <a:pt x="1563370" y="5517112"/>
-                    <a:pt x="1565910" y="5517112"/>
-                    <a:pt x="1568450" y="5515842"/>
-                  </a:cubicBezTo>
-                  <a:cubicBezTo>
-                    <a:pt x="2016760" y="5353282"/>
-                    <a:pt x="2346960" y="4924022"/>
-                    <a:pt x="2353310" y="4414024"/>
-                  </a:cubicBezTo>
-                  <a:lnTo>
-                    <a:pt x="2353310" y="0"/>
-                  </a:lnTo>
-                  <a:lnTo>
-                    <a:pt x="0" y="0"/>
-                  </a:lnTo>
-                  <a:lnTo>
-                    <a:pt x="0" y="4410668"/>
-                  </a:lnTo>
-                  <a:cubicBezTo>
-                    <a:pt x="6350" y="4926562"/>
-                    <a:pt x="331470" y="5355822"/>
-                    <a:pt x="784860" y="5514572"/>
-                  </a:cubicBezTo>
-                  <a:close/>
-                </a:path>
-              </a:pathLst>
-            </a:custGeom>
-            <a:solidFill>
-              <a:srgbClr val="2B4A9D"/>
-            </a:solidFill>
-          </p:spPr>
-        </p:sp>
-      </p:grpSp>
-      <p:sp>
-        <p:nvSpPr>
-          <p:cNvPr id="36" name="CaixaDeTexto 35">
-            <a:extLst>
-              <a:ext uri="{FF2B5EF4-FFF2-40B4-BE49-F238E27FC236}">
-                <a16:creationId xmlns:a16="http://schemas.microsoft.com/office/drawing/2014/main" id="{8227B136-1A81-430E-A876-00B874D65598}"/>
-              </a:ext>
-            </a:extLst>
-          </p:cNvPr>
-          <p:cNvSpPr txBox="1"/>
-          <p:nvPr/>
-        </p:nvSpPr>
-        <p:spPr>
-          <a:xfrm>
-            <a:off x="1561163" y="6782112"/>
-            <a:ext cx="8833440" cy="1593578"/>
-          </a:xfrm>
-          <a:prstGeom prst="rect">
-            <a:avLst/>
-          </a:prstGeom>
-          <a:noFill/>
-        </p:spPr>
-        <p:txBody>
-          <a:bodyPr wrap="square">
-            <a:spAutoFit/>
-          </a:bodyPr>
-          <a:lstStyle/>
-          <a:p>
-            <a:pPr algn="ctr">
-              <a:lnSpc>
-                <a:spcPts val="6300"/>
-              </a:lnSpc>
-            </a:pPr>
-            <a:r>
-              <a:rPr lang="en-US" sz="3200" spc="300" dirty="0">
-                <a:solidFill>
-                  <a:srgbClr val="2B4A9D"/>
-                </a:solidFill>
-                <a:latin typeface="Lato Bold" panose="020F0502020204030203" charset="0"/>
-                <a:ea typeface="Lato Bold" panose="020F0502020204030203" charset="0"/>
-                <a:cs typeface="Lato Bold" panose="020F0502020204030203" charset="0"/>
-              </a:rPr>
-              <a:t>Converter a </a:t>
-            </a:r>
-            <a:r>
-              <a:rPr lang="en-US" sz="3200" spc="300" dirty="0" err="1">
-                <a:solidFill>
-                  <a:srgbClr val="2B4A9D"/>
-                </a:solidFill>
-                <a:latin typeface="Lato Bold" panose="020F0502020204030203" charset="0"/>
-                <a:ea typeface="Lato Bold" panose="020F0502020204030203" charset="0"/>
-                <a:cs typeface="Lato Bold" panose="020F0502020204030203" charset="0"/>
-              </a:rPr>
-              <a:t>fonte</a:t>
-            </a:r>
-            <a:r>
-              <a:rPr lang="en-US" sz="3200" spc="300" dirty="0">
-                <a:solidFill>
-                  <a:srgbClr val="2B4A9D"/>
-                </a:solidFill>
-                <a:latin typeface="Lato Bold" panose="020F0502020204030203" charset="0"/>
-                <a:ea typeface="Lato Bold" panose="020F0502020204030203" charset="0"/>
-                <a:cs typeface="Lato Bold" panose="020F0502020204030203" charset="0"/>
-              </a:rPr>
-              <a:t> de dados </a:t>
-            </a:r>
-            <a:r>
-              <a:rPr lang="en-US" sz="3200" spc="300" dirty="0" err="1">
-                <a:solidFill>
-                  <a:srgbClr val="2B4A9D"/>
-                </a:solidFill>
-                <a:latin typeface="Lato Bold" panose="020F0502020204030203" charset="0"/>
-                <a:ea typeface="Lato Bold" panose="020F0502020204030203" charset="0"/>
-                <a:cs typeface="Lato Bold" panose="020F0502020204030203" charset="0"/>
-              </a:rPr>
-              <a:t>em</a:t>
-            </a:r>
-            <a:r>
-              <a:rPr lang="en-US" sz="3200" spc="300" dirty="0">
-                <a:solidFill>
-                  <a:srgbClr val="2B4A9D"/>
-                </a:solidFill>
-                <a:latin typeface="Lato Bold" panose="020F0502020204030203" charset="0"/>
-                <a:ea typeface="Lato Bold" panose="020F0502020204030203" charset="0"/>
-                <a:cs typeface="Lato Bold" panose="020F0502020204030203" charset="0"/>
-              </a:rPr>
-              <a:t> </a:t>
-            </a:r>
-            <a:r>
-              <a:rPr lang="en-US" sz="3200" spc="300" dirty="0" err="1">
-                <a:solidFill>
-                  <a:srgbClr val="2B4A9D"/>
-                </a:solidFill>
-                <a:latin typeface="Lato Bold" panose="020F0502020204030203" charset="0"/>
-                <a:ea typeface="Lato Bold" panose="020F0502020204030203" charset="0"/>
-                <a:cs typeface="Lato Bold" panose="020F0502020204030203" charset="0"/>
-              </a:rPr>
-              <a:t>uma</a:t>
-            </a:r>
-            <a:r>
-              <a:rPr lang="en-US" sz="3200" spc="300" dirty="0">
-                <a:solidFill>
-                  <a:srgbClr val="2B4A9D"/>
-                </a:solidFill>
-                <a:latin typeface="Lato Bold" panose="020F0502020204030203" charset="0"/>
-                <a:ea typeface="Lato Bold" panose="020F0502020204030203" charset="0"/>
-                <a:cs typeface="Lato Bold" panose="020F0502020204030203" charset="0"/>
-              </a:rPr>
-              <a:t> </a:t>
-            </a:r>
-            <a:r>
-              <a:rPr lang="en-US" sz="3200" spc="300" dirty="0" err="1">
-                <a:solidFill>
-                  <a:srgbClr val="2B4A9D"/>
-                </a:solidFill>
-                <a:latin typeface="Lato Bold" panose="020F0502020204030203" charset="0"/>
-                <a:ea typeface="Lato Bold" panose="020F0502020204030203" charset="0"/>
-                <a:cs typeface="Lato Bold" panose="020F0502020204030203" charset="0"/>
-              </a:rPr>
-              <a:t>lista</a:t>
-            </a:r>
-            <a:r>
-              <a:rPr lang="en-US" sz="3200" spc="300" dirty="0">
-                <a:solidFill>
-                  <a:srgbClr val="2B4A9D"/>
-                </a:solidFill>
-                <a:latin typeface="Lato Bold" panose="020F0502020204030203" charset="0"/>
-                <a:ea typeface="Lato Bold" panose="020F0502020204030203" charset="0"/>
-                <a:cs typeface="Lato Bold" panose="020F0502020204030203" charset="0"/>
-              </a:rPr>
-              <a:t> de widgets</a:t>
-            </a:r>
           </a:p>
         </p:txBody>
       </p:sp>
@@ -5298,8 +5334,8 @@
         </p:nvSpPr>
         <p:spPr bwMode="auto">
           <a:xfrm>
-            <a:off x="835723" y="1450658"/>
-            <a:ext cx="6271955" cy="8463855"/>
+            <a:off x="835723" y="1696879"/>
+            <a:ext cx="6271955" cy="7971413"/>
           </a:xfrm>
           <a:prstGeom prst="rect">
             <a:avLst/>
@@ -5428,17 +5464,10 @@
               <a:tabLst/>
             </a:pPr>
             <a:r>
-              <a:rPr kumimoji="0" lang="pt-BR" altLang="pt-BR" sz="3200" i="0" u="none" strike="noStrike" cap="none" normalizeH="0" baseline="0" dirty="0" err="1">
-                <a:ln>
-                  <a:noFill/>
-                </a:ln>
-                <a:solidFill>
-                  <a:schemeClr val="tx1"/>
-                </a:solidFill>
-                <a:effectLst/>
+              <a:rPr lang="pt-BR" altLang="pt-BR" sz="3200" b="0" dirty="0">
                 <a:latin typeface="Lato "/>
               </a:rPr>
-              <a:t>ListView</a:t>
+              <a:t>E</a:t>
             </a:r>
             <a:r>
               <a:rPr kumimoji="0" lang="pt-BR" altLang="pt-BR" sz="3200" b="0" i="0" u="none" strike="noStrike" cap="none" normalizeH="0" baseline="0" dirty="0">
@@ -5451,7 +5480,7 @@
                 <a:effectLst/>
                 <a:latin typeface="Lato "/>
               </a:rPr>
-              <a:t> exibe uma lista vertical de itens de forma eficiente. </a:t>
+              <a:t>xibe uma lista vertical de itens de forma eficiente. </a:t>
             </a:r>
           </a:p>
           <a:p>
@@ -6077,6 +6106,57 @@
               <a:latin typeface="Lato" panose="020B0604020202020204" charset="0"/>
               <a:ea typeface="Lato" panose="020B0604020202020204" charset="0"/>
               <a:cs typeface="Lato" panose="020B0604020202020204" charset="0"/>
+            </a:endParaRPr>
+          </a:p>
+        </p:txBody>
+      </p:sp>
+      <p:sp>
+        <p:nvSpPr>
+          <p:cNvPr id="7" name="CaixaDeTexto 6">
+            <a:extLst>
+              <a:ext uri="{FF2B5EF4-FFF2-40B4-BE49-F238E27FC236}">
+                <a16:creationId xmlns:a16="http://schemas.microsoft.com/office/drawing/2014/main" id="{EB02D6A5-0E3E-F37E-E8EE-325971DEBF62}"/>
+              </a:ext>
+            </a:extLst>
+          </p:cNvPr>
+          <p:cNvSpPr txBox="1"/>
+          <p:nvPr/>
+        </p:nvSpPr>
+        <p:spPr>
+          <a:xfrm>
+            <a:off x="4242186" y="350142"/>
+            <a:ext cx="9179718" cy="913712"/>
+          </a:xfrm>
+          <a:prstGeom prst="rect">
+            <a:avLst/>
+          </a:prstGeom>
+          <a:noFill/>
+        </p:spPr>
+        <p:txBody>
+          <a:bodyPr wrap="square">
+            <a:spAutoFit/>
+          </a:bodyPr>
+          <a:lstStyle/>
+          <a:p>
+            <a:pPr algn="ctr">
+              <a:lnSpc>
+                <a:spcPts val="6300"/>
+              </a:lnSpc>
+            </a:pPr>
+            <a:r>
+              <a:rPr lang="en-US" sz="6000" spc="300" dirty="0" err="1">
+                <a:solidFill>
+                  <a:srgbClr val="2B4A9D"/>
+                </a:solidFill>
+                <a:latin typeface="Poppins Ultra-Bold"/>
+              </a:rPr>
+              <a:t>ListView.builder</a:t>
+            </a:r>
+            <a:endParaRPr lang="en-US" sz="6000" spc="300" dirty="0">
+              <a:solidFill>
+                <a:srgbClr val="2B4A9D"/>
+              </a:solidFill>
+              <a:latin typeface="Poppins Ultra-Bold"/>
             </a:endParaRPr>
           </a:p>
         </p:txBody>
@@ -6507,13 +6587,207 @@
                 </a:solidFill>
                 <a:latin typeface="Poppins Ultra-Bold"/>
               </a:rPr>
-              <a:t>GridView</a:t>
+              <a:t>GridView.builder</a:t>
             </a:r>
             <a:endParaRPr lang="en-US" sz="6000" spc="300" dirty="0">
               <a:solidFill>
                 <a:srgbClr val="2B4A9D"/>
               </a:solidFill>
               <a:latin typeface="Poppins Ultra-Bold"/>
+            </a:endParaRPr>
+          </a:p>
+        </p:txBody>
+      </p:sp>
+      <p:pic>
+        <p:nvPicPr>
+          <p:cNvPr id="6" name="Imagem 5">
+            <a:extLst>
+              <a:ext uri="{FF2B5EF4-FFF2-40B4-BE49-F238E27FC236}">
+                <a16:creationId xmlns:a16="http://schemas.microsoft.com/office/drawing/2014/main" id="{C8B8C4DE-EC41-555E-B6D2-C8877E7162CF}"/>
+              </a:ext>
+            </a:extLst>
+          </p:cNvPr>
+          <p:cNvPicPr>
+            <a:picLocks noChangeAspect="1"/>
+          </p:cNvPicPr>
+          <p:nvPr/>
+        </p:nvPicPr>
+        <p:blipFill>
+          <a:blip r:embed="rId2">
+            <a:extLst>
+              <a:ext uri="{28A0092B-C50C-407E-A947-70E740481C1C}">
+                <a14:useLocalDpi xmlns:a14="http://schemas.microsoft.com/office/drawing/2010/main" val="0"/>
+              </a:ext>
+            </a:extLst>
+          </a:blip>
+          <a:stretch>
+            <a:fillRect/>
+          </a:stretch>
+        </p:blipFill>
+        <p:spPr>
+          <a:xfrm>
+            <a:off x="2971800" y="2432845"/>
+            <a:ext cx="7582958" cy="2419688"/>
+          </a:xfrm>
+          <a:prstGeom prst="rect">
+            <a:avLst/>
+          </a:prstGeom>
+        </p:spPr>
+      </p:pic>
+      <p:pic>
+        <p:nvPicPr>
+          <p:cNvPr id="8" name="Imagem 7">
+            <a:extLst>
+              <a:ext uri="{FF2B5EF4-FFF2-40B4-BE49-F238E27FC236}">
+                <a16:creationId xmlns:a16="http://schemas.microsoft.com/office/drawing/2014/main" id="{F49E7ED8-E72B-F281-CC62-EABD0C73F0E7}"/>
+              </a:ext>
+            </a:extLst>
+          </p:cNvPr>
+          <p:cNvPicPr>
+            <a:picLocks noChangeAspect="1"/>
+          </p:cNvPicPr>
+          <p:nvPr/>
+        </p:nvPicPr>
+        <p:blipFill>
+          <a:blip r:embed="rId3">
+            <a:extLst>
+              <a:ext uri="{28A0092B-C50C-407E-A947-70E740481C1C}">
+                <a14:useLocalDpi xmlns:a14="http://schemas.microsoft.com/office/drawing/2010/main" val="0"/>
+              </a:ext>
+            </a:extLst>
+          </a:blip>
+          <a:stretch>
+            <a:fillRect/>
+          </a:stretch>
+        </p:blipFill>
+        <p:spPr>
+          <a:xfrm>
+            <a:off x="11704902" y="2031695"/>
+            <a:ext cx="3582723" cy="6455263"/>
+          </a:xfrm>
+          <a:prstGeom prst="rect">
+            <a:avLst/>
+          </a:prstGeom>
+        </p:spPr>
+      </p:pic>
+      <p:sp>
+        <p:nvSpPr>
+          <p:cNvPr id="9" name="CaixaDeTexto 8">
+            <a:extLst>
+              <a:ext uri="{FF2B5EF4-FFF2-40B4-BE49-F238E27FC236}">
+                <a16:creationId xmlns:a16="http://schemas.microsoft.com/office/drawing/2014/main" id="{E972DFED-6EA3-87D3-A616-C79B80E91BA4}"/>
+              </a:ext>
+            </a:extLst>
+          </p:cNvPr>
+          <p:cNvSpPr txBox="1"/>
+          <p:nvPr/>
+        </p:nvSpPr>
+        <p:spPr>
+          <a:xfrm>
+            <a:off x="2191279" y="5074661"/>
+            <a:ext cx="9144000" cy="369332"/>
+          </a:xfrm>
+          <a:prstGeom prst="rect">
+            <a:avLst/>
+          </a:prstGeom>
+          <a:noFill/>
+        </p:spPr>
+        <p:txBody>
+          <a:bodyPr wrap="square">
+            <a:spAutoFit/>
+          </a:bodyPr>
+          <a:lstStyle/>
+          <a:p>
+            <a:pPr algn="ctr"/>
+            <a:r>
+              <a:rPr lang="pt-BR" sz="1800" dirty="0">
+                <a:latin typeface="Lato" panose="020B0604020202020204" charset="0"/>
+                <a:ea typeface="Lato" panose="020B0604020202020204" charset="0"/>
+                <a:cs typeface="Lato" panose="020B0604020202020204" charset="0"/>
+              </a:rPr>
+              <a:t>Figura 05 – Uso do </a:t>
+            </a:r>
+            <a:r>
+              <a:rPr lang="pt-BR" dirty="0" err="1">
+                <a:latin typeface="Lato" panose="020B0604020202020204" charset="0"/>
+                <a:ea typeface="Lato" panose="020B0604020202020204" charset="0"/>
+                <a:cs typeface="Lato" panose="020B0604020202020204" charset="0"/>
+              </a:rPr>
+              <a:t>Grid</a:t>
+            </a:r>
+            <a:r>
+              <a:rPr lang="pt-BR" sz="1800" dirty="0" err="1">
+                <a:latin typeface="Lato" panose="020B0604020202020204" charset="0"/>
+                <a:ea typeface="Lato" panose="020B0604020202020204" charset="0"/>
+                <a:cs typeface="Lato" panose="020B0604020202020204" charset="0"/>
+              </a:rPr>
+              <a:t>View.builder</a:t>
+            </a:r>
+            <a:endParaRPr lang="pt-BR" sz="1800" dirty="0">
+              <a:latin typeface="Lato" panose="020B0604020202020204" charset="0"/>
+              <a:ea typeface="Lato" panose="020B0604020202020204" charset="0"/>
+              <a:cs typeface="Lato" panose="020B0604020202020204" charset="0"/>
+            </a:endParaRPr>
+          </a:p>
+        </p:txBody>
+      </p:sp>
+      <p:sp>
+        <p:nvSpPr>
+          <p:cNvPr id="10" name="CaixaDeTexto 9">
+            <a:extLst>
+              <a:ext uri="{FF2B5EF4-FFF2-40B4-BE49-F238E27FC236}">
+                <a16:creationId xmlns:a16="http://schemas.microsoft.com/office/drawing/2014/main" id="{05D524C2-DCF8-3CD9-9542-C2F4D258A582}"/>
+              </a:ext>
+            </a:extLst>
+          </p:cNvPr>
+          <p:cNvSpPr txBox="1"/>
+          <p:nvPr/>
+        </p:nvSpPr>
+        <p:spPr>
+          <a:xfrm>
+            <a:off x="8924263" y="8709084"/>
+            <a:ext cx="9144000" cy="369332"/>
+          </a:xfrm>
+          <a:prstGeom prst="rect">
+            <a:avLst/>
+          </a:prstGeom>
+          <a:noFill/>
+        </p:spPr>
+        <p:txBody>
+          <a:bodyPr wrap="square">
+            <a:spAutoFit/>
+          </a:bodyPr>
+          <a:lstStyle/>
+          <a:p>
+            <a:pPr algn="ctr"/>
+            <a:r>
+              <a:rPr lang="pt-BR" sz="1800" dirty="0">
+                <a:latin typeface="Lato" panose="020B0604020202020204" charset="0"/>
+                <a:ea typeface="Lato" panose="020B0604020202020204" charset="0"/>
+                <a:cs typeface="Lato" panose="020B0604020202020204" charset="0"/>
+              </a:rPr>
+              <a:t>Figura 06 – Exemplo com o </a:t>
+            </a:r>
+            <a:r>
+              <a:rPr lang="pt-BR" dirty="0" err="1">
+                <a:latin typeface="Lato" panose="020B0604020202020204" charset="0"/>
+                <a:ea typeface="Lato" panose="020B0604020202020204" charset="0"/>
+                <a:cs typeface="Lato" panose="020B0604020202020204" charset="0"/>
+              </a:rPr>
+              <a:t>Grid</a:t>
+            </a:r>
+            <a:r>
+              <a:rPr lang="pt-BR" sz="1800" dirty="0" err="1">
+                <a:latin typeface="Lato" panose="020B0604020202020204" charset="0"/>
+                <a:ea typeface="Lato" panose="020B0604020202020204" charset="0"/>
+                <a:cs typeface="Lato" panose="020B0604020202020204" charset="0"/>
+              </a:rPr>
+              <a:t>View.builder</a:t>
+            </a:r>
+            <a:endParaRPr lang="pt-BR" sz="1800" dirty="0">
+              <a:latin typeface="Lato" panose="020B0604020202020204" charset="0"/>
+              <a:ea typeface="Lato" panose="020B0604020202020204" charset="0"/>
+              <a:cs typeface="Lato" panose="020B0604020202020204" charset="0"/>
             </a:endParaRPr>
           </a:p>
         </p:txBody>
@@ -7003,8 +7277,8 @@
         </p:nvSpPr>
         <p:spPr>
           <a:xfrm>
-            <a:off x="3658873" y="379832"/>
-            <a:ext cx="10970254" cy="1593385"/>
+            <a:off x="3658873" y="1034068"/>
+            <a:ext cx="10970254" cy="1225335"/>
           </a:xfrm>
           <a:prstGeom prst="rect">
             <a:avLst/>
@@ -7016,350 +7290,97 @@
           </a:bodyPr>
           <a:lstStyle/>
           <a:p>
-            <a:pPr algn="ctr">
+            <a:pPr>
               <a:lnSpc>
-                <a:spcPts val="6300"/>
+                <a:spcPts val="4480"/>
               </a:lnSpc>
             </a:pPr>
             <a:r>
-              <a:rPr lang="en-US" sz="5000" spc="300" dirty="0">
+              <a:rPr lang="en-US" sz="6000" spc="350" dirty="0" err="1">
                 <a:solidFill>
                   <a:srgbClr val="2B4A9D"/>
                 </a:solidFill>
-                <a:latin typeface="Poppins Ultra-Bold"/>
-              </a:rPr>
-              <a:t>Converter a </a:t>
-            </a:r>
-            <a:r>
-              <a:rPr lang="en-US" sz="5000" spc="300" dirty="0" err="1">
+                <a:latin typeface="Poppins Ultra-Bold" panose="020B0604020202020204" charset="0"/>
+                <a:cs typeface="Poppins Ultra-Bold" panose="020B0604020202020204" charset="0"/>
+              </a:rPr>
+              <a:t>Listas</a:t>
+            </a:r>
+            <a:r>
+              <a:rPr lang="en-US" sz="6000" spc="350" dirty="0">
                 <a:solidFill>
                   <a:srgbClr val="2B4A9D"/>
                 </a:solidFill>
-                <a:latin typeface="Poppins Ultra-Bold"/>
-              </a:rPr>
-              <a:t>fonte</a:t>
-            </a:r>
-            <a:r>
-              <a:rPr lang="en-US" sz="5000" spc="300" dirty="0">
+                <a:latin typeface="Poppins Ultra-Bold" panose="020B0604020202020204" charset="0"/>
+                <a:cs typeface="Poppins Ultra-Bold" panose="020B0604020202020204" charset="0"/>
+              </a:rPr>
+              <a:t> com </a:t>
+            </a:r>
+            <a:r>
+              <a:rPr lang="en-US" sz="6000" spc="350" dirty="0" err="1">
                 <a:solidFill>
                   <a:srgbClr val="2B4A9D"/>
                 </a:solidFill>
-                <a:latin typeface="Poppins Ultra-Bold"/>
-              </a:rPr>
-              <a:t> de dados </a:t>
-            </a:r>
-            <a:r>
-              <a:rPr lang="en-US" sz="5000" spc="300" dirty="0" err="1">
+                <a:latin typeface="Poppins Ultra-Bold" panose="020B0604020202020204" charset="0"/>
+                <a:cs typeface="Poppins Ultra-Bold" panose="020B0604020202020204" charset="0"/>
+              </a:rPr>
+              <a:t>diferentes</a:t>
+            </a:r>
+            <a:r>
+              <a:rPr lang="en-US" sz="6000" spc="350" dirty="0">
                 <a:solidFill>
                   <a:srgbClr val="2B4A9D"/>
                 </a:solidFill>
-                <a:latin typeface="Poppins Ultra-Bold"/>
-              </a:rPr>
-              <a:t>em</a:t>
-            </a:r>
-            <a:r>
-              <a:rPr lang="en-US" sz="5000" spc="300" dirty="0">
+                <a:latin typeface="Poppins Ultra-Bold" panose="020B0604020202020204" charset="0"/>
+                <a:cs typeface="Poppins Ultra-Bold" panose="020B0604020202020204" charset="0"/>
+              </a:rPr>
+              <a:t> </a:t>
+            </a:r>
+            <a:r>
+              <a:rPr lang="en-US" sz="6000" spc="350" dirty="0" err="1">
                 <a:solidFill>
                   <a:srgbClr val="2B4A9D"/>
                 </a:solidFill>
-                <a:latin typeface="Poppins Ultra-Bold"/>
-              </a:rPr>
-              <a:t> </a:t>
-            </a:r>
-            <a:r>
-              <a:rPr lang="en-US" sz="5000" spc="300" dirty="0" err="1">
+                <a:latin typeface="Poppins Ultra-Bold" panose="020B0604020202020204" charset="0"/>
+                <a:cs typeface="Poppins Ultra-Bold" panose="020B0604020202020204" charset="0"/>
+              </a:rPr>
+              <a:t>tipos</a:t>
+            </a:r>
+            <a:r>
+              <a:rPr lang="en-US" sz="6000" spc="350" dirty="0">
                 <a:solidFill>
                   <a:srgbClr val="2B4A9D"/>
                 </a:solidFill>
-                <a:latin typeface="Poppins Ultra-Bold"/>
-              </a:rPr>
-              <a:t>uma</a:t>
-            </a:r>
-            <a:r>
-              <a:rPr lang="en-US" sz="5000" spc="300" dirty="0">
+                <a:latin typeface="Poppins Ultra-Bold" panose="020B0604020202020204" charset="0"/>
+                <a:cs typeface="Poppins Ultra-Bold" panose="020B0604020202020204" charset="0"/>
+              </a:rPr>
+              <a:t> de </a:t>
+            </a:r>
+            <a:r>
+              <a:rPr lang="en-US" sz="6000" spc="350" dirty="0" err="1">
                 <a:solidFill>
                   <a:srgbClr val="2B4A9D"/>
                 </a:solidFill>
-                <a:latin typeface="Poppins Ultra-Bold"/>
-              </a:rPr>
-              <a:t> </a:t>
-            </a:r>
-            <a:r>
-              <a:rPr lang="en-US" sz="5000" spc="300" dirty="0" err="1">
-                <a:solidFill>
-                  <a:srgbClr val="2B4A9D"/>
-                </a:solidFill>
-                <a:latin typeface="Poppins Ultra-Bold"/>
-              </a:rPr>
-              <a:t>lista</a:t>
-            </a:r>
-            <a:r>
-              <a:rPr lang="en-US" sz="5000" spc="300" dirty="0">
-                <a:solidFill>
-                  <a:srgbClr val="2B4A9D"/>
-                </a:solidFill>
-                <a:latin typeface="Poppins Ultra-Bold"/>
-              </a:rPr>
-              <a:t> de widgets</a:t>
-            </a:r>
-          </a:p>
-        </p:txBody>
-      </p:sp>
-      <p:sp>
-        <p:nvSpPr>
-          <p:cNvPr id="5" name="TextBox 5"/>
-          <p:cNvSpPr txBox="1"/>
-          <p:nvPr/>
-        </p:nvSpPr>
-        <p:spPr>
-          <a:xfrm>
-            <a:off x="816673" y="2066856"/>
-            <a:ext cx="7717727" cy="6832640"/>
-          </a:xfrm>
-          <a:prstGeom prst="rect">
-            <a:avLst/>
-          </a:prstGeom>
-        </p:spPr>
-        <p:txBody>
-          <a:bodyPr wrap="square" lIns="0" tIns="0" rIns="0" bIns="0" rtlCol="0" anchor="t">
-            <a:spAutoFit/>
-          </a:bodyPr>
-          <a:lstStyle/>
-          <a:p>
-            <a:pPr marL="457200" indent="-457200" algn="just">
-              <a:lnSpc>
-                <a:spcPts val="4759"/>
-              </a:lnSpc>
-              <a:buFont typeface="Arial" panose="020B0604020202020204" pitchFamily="34" charset="0"/>
-              <a:buChar char="•"/>
-            </a:pPr>
-            <a:r>
-              <a:rPr kumimoji="0" lang="pt-BR" altLang="pt-BR" sz="2800" b="0" i="0" u="none" strike="noStrike" cap="none" normalizeH="0" baseline="0" dirty="0">
-                <a:ln>
-                  <a:noFill/>
-                </a:ln>
-                <a:solidFill>
-                  <a:schemeClr val="tx1"/>
-                </a:solidFill>
-                <a:effectLst/>
-                <a:latin typeface="Lato" panose="020F0502020204030203" pitchFamily="34" charset="0"/>
-                <a:ea typeface="Lato" panose="020F0502020204030203" pitchFamily="34" charset="0"/>
-                <a:cs typeface="Lato" panose="020F0502020204030203" pitchFamily="34" charset="0"/>
-              </a:rPr>
-              <a:t>O processo de converter a fonte de dados em uma lista de widgets ocorre na função </a:t>
-            </a:r>
-            <a:r>
-              <a:rPr kumimoji="0" lang="pt-BR" altLang="pt-BR" sz="2800" b="0" i="0" u="none" strike="noStrike" cap="none" normalizeH="0" baseline="0" dirty="0" err="1">
-                <a:ln>
-                  <a:noFill/>
-                </a:ln>
-                <a:solidFill>
-                  <a:schemeClr val="tx1"/>
-                </a:solidFill>
-                <a:effectLst/>
-                <a:latin typeface="Lato" panose="020F0502020204030203" pitchFamily="34" charset="0"/>
-                <a:ea typeface="Lato" panose="020F0502020204030203" pitchFamily="34" charset="0"/>
-                <a:cs typeface="Lato" panose="020F0502020204030203" pitchFamily="34" charset="0"/>
-              </a:rPr>
-              <a:t>itemBuilder</a:t>
-            </a:r>
-            <a:r>
-              <a:rPr kumimoji="0" lang="pt-BR" altLang="pt-BR" sz="2800" b="0" i="0" u="none" strike="noStrike" cap="none" normalizeH="0" baseline="0" dirty="0">
-                <a:ln>
-                  <a:noFill/>
-                </a:ln>
-                <a:solidFill>
-                  <a:schemeClr val="tx1"/>
-                </a:solidFill>
-                <a:effectLst/>
-                <a:latin typeface="Lato" panose="020F0502020204030203" pitchFamily="34" charset="0"/>
-                <a:ea typeface="Lato" panose="020F0502020204030203" pitchFamily="34" charset="0"/>
-                <a:cs typeface="Lato" panose="020F0502020204030203" pitchFamily="34" charset="0"/>
-              </a:rPr>
-              <a:t> do widget </a:t>
-            </a:r>
-            <a:r>
-              <a:rPr kumimoji="0" lang="pt-BR" altLang="pt-BR" sz="2800" b="0" i="0" u="none" strike="noStrike" cap="none" normalizeH="0" baseline="0" dirty="0" err="1">
-                <a:ln>
-                  <a:noFill/>
-                </a:ln>
-                <a:solidFill>
-                  <a:schemeClr val="tx1"/>
-                </a:solidFill>
-                <a:effectLst/>
-                <a:latin typeface="Lato" panose="020F0502020204030203" pitchFamily="34" charset="0"/>
-                <a:ea typeface="Lato" panose="020F0502020204030203" pitchFamily="34" charset="0"/>
-                <a:cs typeface="Lato" panose="020F0502020204030203" pitchFamily="34" charset="0"/>
-              </a:rPr>
-              <a:t>FavoriteRecipesScreen</a:t>
-            </a:r>
-            <a:r>
-              <a:rPr lang="pt-BR" altLang="pt-BR" sz="2800" dirty="0">
-                <a:latin typeface="Lato" panose="020F0502020204030203" pitchFamily="34" charset="0"/>
-                <a:ea typeface="Lato" panose="020F0502020204030203" pitchFamily="34" charset="0"/>
-                <a:cs typeface="Lato" panose="020F0502020204030203" pitchFamily="34" charset="0"/>
-              </a:rPr>
-              <a:t>;</a:t>
-            </a:r>
-          </a:p>
-          <a:p>
-            <a:pPr marL="457200" indent="-457200" algn="just">
-              <a:lnSpc>
-                <a:spcPts val="4759"/>
-              </a:lnSpc>
-              <a:buFont typeface="Arial" panose="020B0604020202020204" pitchFamily="34" charset="0"/>
-              <a:buChar char="•"/>
-            </a:pPr>
-            <a:endParaRPr lang="pt-BR" sz="2800" dirty="0">
-              <a:latin typeface="Lato" panose="020B0604020202020204" charset="0"/>
-              <a:ea typeface="Lato" panose="020B0604020202020204" charset="0"/>
-              <a:cs typeface="Lato" panose="020B0604020202020204" charset="0"/>
+                <a:latin typeface="Poppins Ultra-Bold" panose="020B0604020202020204" charset="0"/>
+                <a:cs typeface="Poppins Ultra-Bold" panose="020B0604020202020204" charset="0"/>
+              </a:rPr>
+              <a:t>itens</a:t>
+            </a:r>
+            <a:endParaRPr lang="en-US" sz="6000" spc="350" dirty="0">
+              <a:solidFill>
+                <a:srgbClr val="2B4A9D"/>
+              </a:solidFill>
+              <a:latin typeface="Poppins Ultra-Bold" panose="020B0604020202020204" charset="0"/>
+              <a:cs typeface="Poppins Ultra-Bold" panose="020B0604020202020204" charset="0"/>
             </a:endParaRPr>
-          </a:p>
-          <a:p>
-            <a:pPr marL="457200" indent="-457200" algn="just">
-              <a:lnSpc>
-                <a:spcPts val="4759"/>
-              </a:lnSpc>
-              <a:buFont typeface="Arial" panose="020B0604020202020204" pitchFamily="34" charset="0"/>
-              <a:buChar char="•"/>
-            </a:pPr>
-            <a:r>
-              <a:rPr lang="pt-BR" sz="2800" dirty="0">
-                <a:latin typeface="Lato" panose="020B0604020202020204" charset="0"/>
-                <a:ea typeface="Lato" panose="020B0604020202020204" charset="0"/>
-                <a:cs typeface="Lato" panose="020B0604020202020204" charset="0"/>
-              </a:rPr>
-              <a:t>É utilizado o “</a:t>
-            </a:r>
-            <a:r>
-              <a:rPr lang="pt-BR" sz="2800" dirty="0" err="1">
-                <a:latin typeface="Lato" panose="020B0604020202020204" charset="0"/>
-                <a:ea typeface="Lato" panose="020B0604020202020204" charset="0"/>
-                <a:cs typeface="Lato" panose="020B0604020202020204" charset="0"/>
-              </a:rPr>
-              <a:t>ListView.builder</a:t>
-            </a:r>
-            <a:r>
-              <a:rPr lang="pt-BR" sz="2800" dirty="0">
-                <a:latin typeface="Lato" panose="020B0604020202020204" charset="0"/>
-                <a:ea typeface="Lato" panose="020B0604020202020204" charset="0"/>
-                <a:cs typeface="Lato" panose="020B0604020202020204" charset="0"/>
-              </a:rPr>
-              <a:t>” para </a:t>
-            </a:r>
-            <a:r>
-              <a:rPr lang="pt-BR" sz="2800" dirty="0" err="1">
-                <a:latin typeface="Lato" panose="020B0604020202020204" charset="0"/>
-                <a:ea typeface="Lato" panose="020B0604020202020204" charset="0"/>
-                <a:cs typeface="Lato" panose="020B0604020202020204" charset="0"/>
-              </a:rPr>
-              <a:t>contruir</a:t>
-            </a:r>
-            <a:r>
-              <a:rPr lang="pt-BR" sz="2800" dirty="0">
-                <a:latin typeface="Lato" panose="020B0604020202020204" charset="0"/>
-                <a:ea typeface="Lato" panose="020B0604020202020204" charset="0"/>
-                <a:cs typeface="Lato" panose="020B0604020202020204" charset="0"/>
-              </a:rPr>
-              <a:t> a lista de widgets com base na fonte de dados </a:t>
-            </a:r>
-            <a:r>
-              <a:rPr lang="pt-BR" sz="2800" dirty="0" err="1">
-                <a:latin typeface="Lato" panose="020B0604020202020204" charset="0"/>
-                <a:ea typeface="Lato" panose="020B0604020202020204" charset="0"/>
-                <a:cs typeface="Lato" panose="020B0604020202020204" charset="0"/>
-              </a:rPr>
-              <a:t>favoriteRecipes</a:t>
-            </a:r>
-            <a:r>
-              <a:rPr lang="pt-BR" sz="2800" dirty="0">
-                <a:latin typeface="Lato" panose="020B0604020202020204" charset="0"/>
-                <a:ea typeface="Lato" panose="020B0604020202020204" charset="0"/>
-                <a:cs typeface="Lato" panose="020B0604020202020204" charset="0"/>
-              </a:rPr>
-              <a:t>, que contém as receitas marcadas como favoritas;</a:t>
-            </a:r>
-          </a:p>
-          <a:p>
-            <a:pPr marL="457200" indent="-457200" algn="just">
-              <a:lnSpc>
-                <a:spcPts val="4759"/>
-              </a:lnSpc>
-              <a:buFont typeface="Arial" panose="020B0604020202020204" pitchFamily="34" charset="0"/>
-              <a:buChar char="•"/>
-            </a:pPr>
-            <a:endParaRPr lang="pt-BR" sz="2800" dirty="0">
-              <a:latin typeface="Lato" panose="020B0604020202020204" charset="0"/>
-              <a:ea typeface="Lato" panose="020B0604020202020204" charset="0"/>
-              <a:cs typeface="Lato" panose="020B0604020202020204" charset="0"/>
-            </a:endParaRPr>
-          </a:p>
-          <a:p>
-            <a:pPr marL="457200" marR="0" lvl="0" indent="-457200" algn="l" defTabSz="914400" rtl="0" eaLnBrk="0" fontAlgn="base" latinLnBrk="0" hangingPunct="0">
-              <a:lnSpc>
-                <a:spcPct val="100000"/>
-              </a:lnSpc>
-              <a:spcBef>
-                <a:spcPct val="0"/>
-              </a:spcBef>
-              <a:spcAft>
-                <a:spcPct val="0"/>
-              </a:spcAft>
-              <a:buClrTx/>
-              <a:buSzTx/>
-              <a:buFont typeface="Arial" panose="020B0604020202020204" pitchFamily="34" charset="0"/>
-              <a:buChar char="•"/>
-              <a:tabLst/>
-            </a:pPr>
-            <a:r>
-              <a:rPr kumimoji="0" lang="pt-BR" altLang="pt-BR" sz="2800" b="0" i="0" u="none" strike="noStrike" cap="none" normalizeH="0" baseline="0" dirty="0">
-                <a:ln>
-                  <a:noFill/>
-                </a:ln>
-                <a:solidFill>
-                  <a:schemeClr val="tx1"/>
-                </a:solidFill>
-                <a:effectLst/>
-                <a:latin typeface="Lato "/>
-              </a:rPr>
-              <a:t>Para cada item na lista, foi criado um widget Container para estilizar o item, que encapsula um </a:t>
-            </a:r>
-            <a:r>
-              <a:rPr kumimoji="0" lang="pt-BR" altLang="pt-BR" sz="2800" b="0" i="0" u="none" strike="noStrike" cap="none" normalizeH="0" baseline="0" dirty="0" err="1">
-                <a:ln>
-                  <a:noFill/>
-                </a:ln>
-                <a:solidFill>
-                  <a:schemeClr val="tx1"/>
-                </a:solidFill>
-                <a:effectLst/>
-                <a:latin typeface="Lato "/>
-              </a:rPr>
-              <a:t>ListTile</a:t>
-            </a:r>
-            <a:r>
-              <a:rPr kumimoji="0" lang="pt-BR" altLang="pt-BR" sz="2800" b="0" i="0" u="none" strike="noStrike" cap="none" normalizeH="0" baseline="0" dirty="0">
-                <a:ln>
-                  <a:noFill/>
-                </a:ln>
-                <a:solidFill>
-                  <a:schemeClr val="tx1"/>
-                </a:solidFill>
-                <a:effectLst/>
-                <a:latin typeface="Lato "/>
-              </a:rPr>
-              <a:t>. </a:t>
-            </a:r>
           </a:p>
         </p:txBody>
       </p:sp>
       <p:pic>
         <p:nvPicPr>
-          <p:cNvPr id="9" name="Imagem 8">
+          <p:cNvPr id="15" name="Imagem 14">
             <a:extLst>
               <a:ext uri="{FF2B5EF4-FFF2-40B4-BE49-F238E27FC236}">
-                <a16:creationId xmlns:a16="http://schemas.microsoft.com/office/drawing/2014/main" id="{23124575-2B41-2408-F62D-7F94E58496E6}"/>
+                <a16:creationId xmlns:a16="http://schemas.microsoft.com/office/drawing/2014/main" id="{086BB331-A0FB-6671-35F1-945AEE28FCD2}"/>
               </a:ext>
             </a:extLst>
           </p:cNvPr>
@@ -7382,8 +7403,8 @@
         </p:blipFill>
         <p:spPr>
           <a:xfrm>
-            <a:off x="9336129" y="2419204"/>
-            <a:ext cx="8287598" cy="1428896"/>
+            <a:off x="1981200" y="2773083"/>
+            <a:ext cx="6325483" cy="5734850"/>
           </a:xfrm>
           <a:prstGeom prst="rect">
             <a:avLst/>
@@ -7392,10 +7413,10 @@
       </p:pic>
       <p:pic>
         <p:nvPicPr>
-          <p:cNvPr id="11" name="Imagem 10">
+          <p:cNvPr id="19" name="Imagem 18">
             <a:extLst>
               <a:ext uri="{FF2B5EF4-FFF2-40B4-BE49-F238E27FC236}">
-                <a16:creationId xmlns:a16="http://schemas.microsoft.com/office/drawing/2014/main" id="{B34DDB36-8A25-7954-4346-F3E05009723A}"/>
+                <a16:creationId xmlns:a16="http://schemas.microsoft.com/office/drawing/2014/main" id="{3B87F486-01B7-967E-DFDC-BE9B6D3112B3}"/>
               </a:ext>
             </a:extLst>
           </p:cNvPr>
@@ -7418,14 +7439,264 @@
         </p:blipFill>
         <p:spPr>
           <a:xfrm>
-            <a:off x="9336129" y="4914900"/>
-            <a:ext cx="8287598" cy="3841162"/>
+            <a:off x="10210800" y="2857500"/>
+            <a:ext cx="6725589" cy="5477639"/>
           </a:xfrm>
           <a:prstGeom prst="rect">
             <a:avLst/>
           </a:prstGeom>
         </p:spPr>
       </p:pic>
+      <p:sp>
+        <p:nvSpPr>
+          <p:cNvPr id="20" name="CaixaDeTexto 19">
+            <a:extLst>
+              <a:ext uri="{FF2B5EF4-FFF2-40B4-BE49-F238E27FC236}">
+                <a16:creationId xmlns:a16="http://schemas.microsoft.com/office/drawing/2014/main" id="{EC058378-8A17-40F9-1E8D-67876AA983DC}"/>
+              </a:ext>
+            </a:extLst>
+          </p:cNvPr>
+          <p:cNvSpPr txBox="1"/>
+          <p:nvPr/>
+        </p:nvSpPr>
+        <p:spPr>
+          <a:xfrm>
+            <a:off x="571941" y="8680727"/>
+            <a:ext cx="9144000" cy="646331"/>
+          </a:xfrm>
+          <a:prstGeom prst="rect">
+            <a:avLst/>
+          </a:prstGeom>
+          <a:noFill/>
+        </p:spPr>
+        <p:txBody>
+          <a:bodyPr wrap="square">
+            <a:spAutoFit/>
+          </a:bodyPr>
+          <a:lstStyle/>
+          <a:p>
+            <a:pPr algn="ctr"/>
+            <a:r>
+              <a:rPr lang="pt-BR" sz="1800" dirty="0">
+                <a:latin typeface="Lato" panose="020B0604020202020204" charset="0"/>
+                <a:ea typeface="Lato" panose="020B0604020202020204" charset="0"/>
+                <a:cs typeface="Lato" panose="020B0604020202020204" charset="0"/>
+              </a:rPr>
+              <a:t>Figura 0</a:t>
+            </a:r>
+            <a:r>
+              <a:rPr lang="pt-BR" dirty="0">
+                <a:latin typeface="Lato" panose="020B0604020202020204" charset="0"/>
+                <a:ea typeface="Lato" panose="020B0604020202020204" charset="0"/>
+                <a:cs typeface="Lato" panose="020B0604020202020204" charset="0"/>
+              </a:rPr>
+              <a:t>7</a:t>
+            </a:r>
+            <a:r>
+              <a:rPr lang="pt-BR" sz="1800" dirty="0">
+                <a:latin typeface="Lato" panose="020B0604020202020204" charset="0"/>
+                <a:ea typeface="Lato" panose="020B0604020202020204" charset="0"/>
+                <a:cs typeface="Lato" panose="020B0604020202020204" charset="0"/>
+              </a:rPr>
+              <a:t> – Uso de </a:t>
+            </a:r>
+            <a:r>
+              <a:rPr lang="en-US" spc="350" dirty="0" err="1">
+                <a:latin typeface="Lato "/>
+                <a:ea typeface="Lato" panose="020B0604020202020204" charset="0"/>
+                <a:cs typeface="Poppins Ultra-Bold" panose="020B0604020202020204" charset="0"/>
+              </a:rPr>
+              <a:t>l</a:t>
+            </a:r>
+            <a:r>
+              <a:rPr lang="en-US" sz="1800" spc="350" dirty="0" err="1">
+                <a:latin typeface="Lato "/>
+                <a:cs typeface="Poppins Ultra-Bold" panose="020B0604020202020204" charset="0"/>
+              </a:rPr>
+              <a:t>istas</a:t>
+            </a:r>
+            <a:r>
+              <a:rPr lang="en-US" sz="1800" spc="350" dirty="0">
+                <a:latin typeface="Lato "/>
+                <a:cs typeface="Poppins Ultra-Bold" panose="020B0604020202020204" charset="0"/>
+              </a:rPr>
+              <a:t> com </a:t>
+            </a:r>
+            <a:r>
+              <a:rPr lang="en-US" sz="1800" spc="350" dirty="0" err="1">
+                <a:latin typeface="Lato "/>
+                <a:cs typeface="Poppins Ultra-Bold" panose="020B0604020202020204" charset="0"/>
+              </a:rPr>
+              <a:t>diferentes</a:t>
+            </a:r>
+            <a:r>
+              <a:rPr lang="en-US" sz="1800" spc="350" dirty="0">
+                <a:latin typeface="Lato "/>
+                <a:cs typeface="Poppins Ultra-Bold" panose="020B0604020202020204" charset="0"/>
+              </a:rPr>
+              <a:t> </a:t>
+            </a:r>
+            <a:r>
+              <a:rPr lang="en-US" sz="1800" spc="350" dirty="0" err="1">
+                <a:latin typeface="Lato "/>
+                <a:cs typeface="Poppins Ultra-Bold" panose="020B0604020202020204" charset="0"/>
+              </a:rPr>
+              <a:t>tipos</a:t>
+            </a:r>
+            <a:r>
+              <a:rPr lang="en-US" sz="1800" spc="350" dirty="0">
+                <a:latin typeface="Lato "/>
+                <a:cs typeface="Poppins Ultra-Bold" panose="020B0604020202020204" charset="0"/>
+              </a:rPr>
+              <a:t> de </a:t>
+            </a:r>
+            <a:r>
+              <a:rPr lang="en-US" sz="1800" spc="350" dirty="0" err="1">
+                <a:latin typeface="Lato "/>
+                <a:cs typeface="Poppins Ultra-Bold" panose="020B0604020202020204" charset="0"/>
+              </a:rPr>
+              <a:t>itens</a:t>
+            </a:r>
+            <a:endParaRPr lang="en-US" sz="1800" spc="350" dirty="0">
+              <a:latin typeface="Lato "/>
+              <a:cs typeface="Poppins Ultra-Bold" panose="020B0604020202020204" charset="0"/>
+            </a:endParaRPr>
+          </a:p>
+          <a:p>
+            <a:pPr algn="ctr"/>
+            <a:endParaRPr lang="pt-BR" sz="1800" dirty="0">
+              <a:latin typeface="Lato" panose="020B0604020202020204" charset="0"/>
+              <a:ea typeface="Lato" panose="020B0604020202020204" charset="0"/>
+              <a:cs typeface="Lato" panose="020B0604020202020204" charset="0"/>
+            </a:endParaRPr>
+          </a:p>
+        </p:txBody>
+      </p:sp>
+      <p:sp>
+        <p:nvSpPr>
+          <p:cNvPr id="21" name="CaixaDeTexto 20">
+            <a:extLst>
+              <a:ext uri="{FF2B5EF4-FFF2-40B4-BE49-F238E27FC236}">
+                <a16:creationId xmlns:a16="http://schemas.microsoft.com/office/drawing/2014/main" id="{9C8CD144-701D-B503-F0BC-ADCE58FAC3DE}"/>
+              </a:ext>
+            </a:extLst>
+          </p:cNvPr>
+          <p:cNvSpPr txBox="1"/>
+          <p:nvPr/>
+        </p:nvSpPr>
+        <p:spPr>
+          <a:xfrm>
+            <a:off x="9001594" y="8507933"/>
+            <a:ext cx="9144000" cy="646331"/>
+          </a:xfrm>
+          <a:prstGeom prst="rect">
+            <a:avLst/>
+          </a:prstGeom>
+          <a:noFill/>
+        </p:spPr>
+        <p:txBody>
+          <a:bodyPr wrap="square">
+            <a:spAutoFit/>
+          </a:bodyPr>
+          <a:lstStyle/>
+          <a:p>
+            <a:pPr algn="ctr"/>
+            <a:r>
+              <a:rPr lang="pt-BR" sz="1800" dirty="0">
+                <a:latin typeface="Lato" panose="020B0604020202020204" charset="0"/>
+                <a:ea typeface="Lato" panose="020B0604020202020204" charset="0"/>
+                <a:cs typeface="Lato" panose="020B0604020202020204" charset="0"/>
+              </a:rPr>
+              <a:t>Figura 0</a:t>
+            </a:r>
+            <a:r>
+              <a:rPr lang="pt-BR" dirty="0">
+                <a:latin typeface="Lato" panose="020B0604020202020204" charset="0"/>
+                <a:ea typeface="Lato" panose="020B0604020202020204" charset="0"/>
+                <a:cs typeface="Lato" panose="020B0604020202020204" charset="0"/>
+              </a:rPr>
+              <a:t>8</a:t>
+            </a:r>
+            <a:r>
+              <a:rPr lang="pt-BR" sz="1800" dirty="0">
+                <a:latin typeface="Lato" panose="020B0604020202020204" charset="0"/>
+                <a:ea typeface="Lato" panose="020B0604020202020204" charset="0"/>
+                <a:cs typeface="Lato" panose="020B0604020202020204" charset="0"/>
+              </a:rPr>
+              <a:t> – Uso de Uso de </a:t>
+            </a:r>
+            <a:r>
+              <a:rPr lang="en-US" spc="350" dirty="0" err="1">
+                <a:latin typeface="Lato "/>
+                <a:ea typeface="Lato" panose="020B0604020202020204" charset="0"/>
+                <a:cs typeface="Poppins Ultra-Bold" panose="020B0604020202020204" charset="0"/>
+              </a:rPr>
+              <a:t>l</a:t>
+            </a:r>
+            <a:r>
+              <a:rPr lang="en-US" sz="1800" spc="350" dirty="0" err="1">
+                <a:latin typeface="Lato "/>
+                <a:cs typeface="Poppins Ultra-Bold" panose="020B0604020202020204" charset="0"/>
+              </a:rPr>
+              <a:t>istas</a:t>
+            </a:r>
+            <a:r>
+              <a:rPr lang="en-US" sz="1800" spc="350" dirty="0">
+                <a:latin typeface="Lato "/>
+                <a:cs typeface="Poppins Ultra-Bold" panose="020B0604020202020204" charset="0"/>
+              </a:rPr>
+              <a:t> com </a:t>
+            </a:r>
+            <a:r>
+              <a:rPr lang="en-US" sz="1800" spc="350" dirty="0" err="1">
+                <a:latin typeface="Lato "/>
+                <a:cs typeface="Poppins Ultra-Bold" panose="020B0604020202020204" charset="0"/>
+              </a:rPr>
+              <a:t>diferentes</a:t>
+            </a:r>
+            <a:r>
+              <a:rPr lang="en-US" sz="1800" spc="350" dirty="0">
+                <a:latin typeface="Lato "/>
+                <a:cs typeface="Poppins Ultra-Bold" panose="020B0604020202020204" charset="0"/>
+              </a:rPr>
+              <a:t> </a:t>
+            </a:r>
+            <a:r>
+              <a:rPr lang="en-US" sz="1800" spc="350" dirty="0" err="1">
+                <a:latin typeface="Lato "/>
+                <a:cs typeface="Poppins Ultra-Bold" panose="020B0604020202020204" charset="0"/>
+              </a:rPr>
+              <a:t>tipos</a:t>
+            </a:r>
+            <a:r>
+              <a:rPr lang="en-US" sz="1800" spc="350" dirty="0">
+                <a:latin typeface="Lato "/>
+                <a:cs typeface="Poppins Ultra-Bold" panose="020B0604020202020204" charset="0"/>
+              </a:rPr>
+              <a:t> de </a:t>
+            </a:r>
+            <a:r>
+              <a:rPr lang="en-US" sz="1800" spc="350" dirty="0" err="1">
+                <a:latin typeface="Lato "/>
+                <a:cs typeface="Poppins Ultra-Bold" panose="020B0604020202020204" charset="0"/>
+              </a:rPr>
+              <a:t>itens</a:t>
+            </a:r>
+            <a:endParaRPr lang="en-US" sz="1800" spc="350" dirty="0">
+              <a:latin typeface="Lato "/>
+              <a:cs typeface="Poppins Ultra-Bold" panose="020B0604020202020204" charset="0"/>
+            </a:endParaRPr>
+          </a:p>
+          <a:p>
+            <a:pPr algn="ctr"/>
+            <a:endParaRPr lang="pt-BR" sz="1800" dirty="0">
+              <a:latin typeface="Lato" panose="020B0604020202020204" charset="0"/>
+              <a:ea typeface="Lato" panose="020B0604020202020204" charset="0"/>
+              <a:cs typeface="Lato" panose="020B0604020202020204" charset="0"/>
+            </a:endParaRPr>
+          </a:p>
+        </p:txBody>
+      </p:sp>
     </p:spTree>
     <p:extLst>
       <p:ext uri="{BB962C8B-B14F-4D97-AF65-F5344CB8AC3E}">
@@ -7751,7 +8022,7 @@
                 <a:latin typeface="Poppins" panose="00000500000000000000" pitchFamily="2" charset="0"/>
                 <a:cs typeface="Poppins" panose="00000500000000000000" pitchFamily="2" charset="0"/>
               </a:rPr>
-              <a:t>. Acesso em: 03 dez. 2024.</a:t>
+              <a:t>. Acesso em: 04 dez. 2024.</a:t>
             </a:r>
           </a:p>
         </p:txBody>

</xml_diff>